<commit_message>
New translations in_person_sessions.pptx (Malay)
</commit_message>
<xml_diff>
--- a/translations/facilitator_app_malaysia/ms/ms_in_person_sessions.pptx
+++ b/translations/facilitator_app_malaysia/ms/ms_in_person_sessions.pptx
@@ -2280,7 +2280,7 @@
               </a:defRPr>
             </a:pPr>
             <a:r>
-              <a:t>Ask the parents:</a:t>
+              <a:t>Tanya kepada ibu bapa:</a:t>
             </a:r>
             <a:endParaRPr>
               <a:solidFill>
@@ -2343,7 +2343,7 @@
               </a:defRPr>
             </a:pPr>
             <a:r>
-              <a:t>(Possible answers from the parents: She says Mira’s name. She is at the same level as Mira. She is looking at Mira. She asks her what she wants to do. She allows Mira to choose the activity.)</a:t>
+              <a:t>(Jawapan yang mungkin diberikan oleh ibu bapa: Dia menyebut nama Mira. She is at the same level as Mira. She is looking at Mira. She asks her what she wants to do. She allows Mira to choose the activity.)</a:t>
             </a:r>
             <a:endParaRPr i="1">
               <a:solidFill>
@@ -2406,7 +2406,7 @@
               </a:defRPr>
             </a:pPr>
             <a:r>
-              <a:t>(Possible answers from the parents: The mother tells her she has 5 minutes to spend with her. The mother might have other things to do).</a:t>
+              <a:t>(Jawapan yang mungkin diberikan oleh ibu bapa: Ibu memberitahu dia mempunyai masa selama 5 minit untuk diluangkan bersama Mira. Ibunya mungkin ada perkara lain untuk diuruskan).</a:t>
             </a:r>
             <a:endParaRPr>
               <a:solidFill>
@@ -2438,7 +2438,7 @@
               </a:defRPr>
             </a:pPr>
             <a:r>
-              <a:t>Blocks 2 to Block 3 also show how mother allows Mira to take the lead. Ask the parents:</a:t>
+              <a:t>Blocks 2 to Block 3 also show how mother allows Mira to take the lead. Tanya kepada ibu bapa:</a:t>
             </a:r>
             <a:endParaRPr>
               <a:solidFill>
@@ -2501,7 +2501,7 @@
               </a:defRPr>
             </a:pPr>
             <a:r>
-              <a:t>(Possible answers from the parents: She is looking at Mira. She says her name).</a:t>
+              <a:t>(Jawapan yang mungkin diberikan oleh ibu bapa: Dia memandang Mira. She says her name).</a:t>
             </a:r>
             <a:endParaRPr i="1">
               <a:solidFill>
@@ -2564,7 +2564,7 @@
               </a:defRPr>
             </a:pPr>
             <a:r>
-              <a:t>(Possible answers from the parents: She allows Mira to choose the activity. She accepts Mira’s proposals. She observes what Mira is doing. She sits back and lets Mira direct what happens in One-on-One Time).</a:t>
+              <a:t>(Jawapan yang mungkin diberikan oleh ibu bapa: Dia membenarkan Mira untuk memilih aktiviti. Dia menerima cadangan Mira. She observes what Mira is doing. She sits back and lets Mira direct what happens in One-on-One Time).</a:t>
             </a:r>
             <a:endParaRPr>
               <a:solidFill>
@@ -2596,7 +2596,7 @@
               </a:defRPr>
             </a:pPr>
             <a:r>
-              <a:t>Block 3 also demonstrates how parents can use words to describe what their children are doing. Ask the parents:</a:t>
+              <a:t>Block 3 also demonstrates how parents can use words to describe what their children are doing. Tanya kepada ibu bapa:</a:t>
             </a:r>
             <a:endParaRPr>
               <a:solidFill>
@@ -2691,7 +2691,7 @@
               </a:defRPr>
             </a:pPr>
             <a:r>
-              <a:t>Block 4 (and all of the other blocks) show how children might respond to spending One-on- One Time with their parents. Ask the parents:</a:t>
+              <a:t>Block 4 (and all of the other blocks) show how children might respond to spending One-on- One Time with their parents. Tanya kepada ibu bapa:</a:t>
             </a:r>
             <a:endParaRPr>
               <a:solidFill>
@@ -2754,7 +2754,7 @@
               </a:defRPr>
             </a:pPr>
             <a:r>
-              <a:t>(Possible answers from the parents: Mira is happy. She feels loved. She feels important. She feels appreciated. She feels confident. Mira feels close to her mother).</a:t>
+              <a:t>(Jawapan yang mungkin diberikan oleh ibu bapa: Mira gembira. She feels loved. She feels important. She feels appreciated. She feels confident. Mira feels close to her mother).</a:t>
             </a:r>
           </a:p>
         </p:txBody>
@@ -4397,7 +4397,7 @@
               </a:defRPr>
             </a:pPr>
             <a:r>
-              <a:t>✏️Instructions </a:t>
+              <a:t>✏️Arahan </a:t>
             </a:r>
             <a:endParaRPr b="1">
               <a:solidFill>
@@ -5282,7 +5282,7 @@
             </a:r>
             <a:r>
               <a:rPr b="1"/>
-              <a:t>Instructions </a:t>
+              <a:t>Arahan </a:t>
             </a:r>
             <a:endParaRPr b="1">
               <a:solidFill>
@@ -5614,7 +5614,7 @@
               </a:defRPr>
             </a:pPr>
             <a:r>
-              <a:t>Give as few instructions or directions as possible.</a:t>
+              <a:t>Beri arahan atau petunjuk seminimum mungkin.</a:t>
             </a:r>
             <a:endParaRPr b="1">
               <a:solidFill>
@@ -6476,7 +6476,7 @@
             </a:r>
             <a:r>
               <a:rPr b="1"/>
-              <a:t>Instructions </a:t>
+              <a:t>Arahan </a:t>
             </a:r>
             <a:endParaRPr b="1">
               <a:solidFill>
@@ -7072,7 +7072,7 @@
               </a:defRPr>
             </a:pPr>
             <a:r>
-              <a:t>✏️Instructions</a:t>
+              <a:t>✏️Arahan</a:t>
             </a:r>
             <a:endParaRPr b="1">
               <a:solidFill>
@@ -7878,7 +7878,7 @@
             </a:r>
             <a:r>
               <a:rPr b="1"/>
-              <a:t>Instructions</a:t>
+              <a:t>Arahan</a:t>
             </a:r>
             <a:endParaRPr b="1">
               <a:solidFill>
@@ -12139,7 +12139,7 @@
               </a:defRPr>
             </a:pPr>
             <a:r>
-              <a:t>Just like Taking a Pause, you can pause for about 5 seconds at each [Pause] in the text. It is helpful to follow your own instructions during the pause.</a:t>
+              <a:t>Just like Taking a Pause, you can pause for about 5 seconds at each [Pause] in the text. Semasa berhenti, ia mungkin membantu jika anda mengikut arahan anda sendiri.</a:t>
             </a:r>
             <a:endParaRPr>
               <a:solidFill>
@@ -13569,7 +13569,7 @@
             </a:r>
             <a:r>
               <a:rPr b="1"/>
-              <a:t>Instructions </a:t>
+              <a:t>Arahan </a:t>
             </a:r>
             <a:endParaRPr b="1">
               <a:solidFill>
@@ -17131,7 +17131,7 @@
               </a:defRPr>
             </a:pPr>
             <a:r>
-              <a:t>✏️Instructions </a:t>
+              <a:t>✏️Arahan </a:t>
             </a:r>
             <a:endParaRPr b="1">
               <a:solidFill>
@@ -17227,7 +17227,7 @@
               </a:defRPr>
             </a:pPr>
             <a:r>
-              <a:t>Give participants the following instructions:</a:t>
+              <a:t>Berikan peserta arahan yang berikut:</a:t>
             </a:r>
             <a:endParaRPr>
               <a:solidFill>
@@ -17497,7 +17497,7 @@
               </a:defRPr>
             </a:pPr>
             <a:r>
-              <a:t>Text, images, and video</a:t>
+              <a:t>Teks, imej, dan video</a:t>
             </a:r>
             <a:endParaRPr>
               <a:solidFill>
@@ -17528,7 +17528,7 @@
               </a:defRPr>
             </a:pPr>
             <a:r>
-              <a:t>Text, images, and audio</a:t>
+              <a:t>Teks, imej, dan audio</a:t>
             </a:r>
             <a:endParaRPr>
               <a:solidFill>
@@ -17559,7 +17559,7 @@
               </a:defRPr>
             </a:pPr>
             <a:r>
-              <a:t>Text and images only</a:t>
+              <a:t>Teks dan imej sahaja</a:t>
             </a:r>
             <a:endParaRPr>
               <a:solidFill>
@@ -29485,7 +29485,7 @@
               </a:defRPr>
             </a:pPr>
             <a:r>
-              <a:t>Give as few instructions or directions as possible.</a:t>
+              <a:t>Beri arahan atau petunjuk seminimum mungkin.</a:t>
             </a:r>
             <a:endParaRPr sz="1100">
               <a:solidFill>
@@ -41075,7 +41075,7 @@
               </a:defRPr>
             </a:pPr>
             <a:r>
-              <a:t>Text, images, and video</a:t>
+              <a:t>Teks, imej, dan video</a:t>
             </a:r>
             <a:endParaRPr sz="1500">
               <a:solidFill>
@@ -41106,7 +41106,7 @@
               </a:defRPr>
             </a:pPr>
             <a:r>
-              <a:t>Text, images, and audio</a:t>
+              <a:t>Teks, imej, dan audio</a:t>
             </a:r>
             <a:endParaRPr sz="1500">
               <a:solidFill>
@@ -41137,7 +41137,7 @@
               </a:defRPr>
             </a:pPr>
             <a:r>
-              <a:t>Text and images only</a:t>
+              <a:t>Teks dan imej sahaja</a:t>
             </a:r>
             <a:endParaRPr sz="800">
               <a:solidFill>

</xml_diff>